<commit_message>
win és linux server dia frissítés
</commit_message>
<xml_diff>
--- a/BEMUTATÓ/Halozattervezesi_vizsgaremek_ppt.pptx
+++ b/BEMUTATÓ/Halozattervezesi_vizsgaremek_ppt.pptx
@@ -139,6 +139,9 @@
         </p15:guide>
       </p15:sldGuideLst>
     </p:ext>
+    <p:ext uri="{2D200454-40CA-4A62-9FC3-DE9A4176ACB9}">
+      <p15:notesGuideLst xmlns:p15="http://schemas.microsoft.com/office/powerpoint/2012/main"/>
+    </p:ext>
   </p:extLst>
 </p:presentation>
 </file>
@@ -225,7 +228,7 @@
           <a:p>
             <a:fld id="{F7ADC6D0-E922-4141-8754-0138B1CE9B91}" type="datetimeFigureOut">
               <a:rPr lang="hu-HU" smtClean="0"/>
-              <a:t>2024. 06. 08.</a:t>
+              <a:t>2024. 06. 09.</a:t>
             </a:fld>
             <a:endParaRPr lang="hu-HU"/>
           </a:p>
@@ -972,7 +975,78 @@
           <a:bodyPr/>
           <a:lstStyle/>
           <a:p>
-            <a:endParaRPr lang="hu-HU"/>
+            <a:r>
+              <a:rPr lang="hu-HU" dirty="0"/>
+              <a:t>Miért </a:t>
+            </a:r>
+            <a:r>
+              <a:rPr lang="hu-HU" dirty="0" err="1"/>
+              <a:t>WinServer</a:t>
+            </a:r>
+            <a:r>
+              <a:rPr lang="hu-HU" dirty="0"/>
+              <a:t>? </a:t>
+            </a:r>
+          </a:p>
+          <a:p>
+            <a:r>
+              <a:rPr lang="hu-HU" dirty="0"/>
+              <a:t>Felhasználóbarát felület</a:t>
+            </a:r>
+          </a:p>
+          <a:p>
+            <a:r>
+              <a:rPr lang="hu-HU" dirty="0"/>
+              <a:t>Kompatibilitás a kliensekkel</a:t>
+            </a:r>
+          </a:p>
+          <a:p>
+            <a:r>
+              <a:rPr lang="hu-HU" dirty="0"/>
+              <a:t>Széleskörű </a:t>
+            </a:r>
+            <a:r>
+              <a:rPr lang="hu-HU" dirty="0" err="1"/>
+              <a:t>támogats</a:t>
+            </a:r>
+            <a:r>
+              <a:rPr lang="hu-HU" dirty="0"/>
+              <a:t> (hibajavítás, frissítés)</a:t>
+            </a:r>
+          </a:p>
+          <a:p>
+            <a:r>
+              <a:rPr lang="hu-HU" dirty="0"/>
+              <a:t>Versenyképes </a:t>
+            </a:r>
+            <a:r>
+              <a:rPr lang="hu-HU" dirty="0" err="1"/>
+              <a:t>virtualizációs</a:t>
+            </a:r>
+            <a:r>
+              <a:rPr lang="hu-HU" dirty="0"/>
+              <a:t> megoldás (</a:t>
+            </a:r>
+            <a:r>
+              <a:rPr lang="hu-HU" dirty="0" err="1"/>
+              <a:t>Hyper</a:t>
+            </a:r>
+            <a:r>
+              <a:rPr lang="hu-HU" dirty="0"/>
+              <a:t>-V)</a:t>
+            </a:r>
+          </a:p>
+          <a:p>
+            <a:r>
+              <a:rPr lang="hu-HU" dirty="0"/>
+              <a:t>Számos alkalmazás</a:t>
+            </a:r>
+          </a:p>
+          <a:p>
+            <a:r>
+              <a:rPr lang="hu-HU" dirty="0"/>
+              <a:t>Házirendek</a:t>
+            </a:r>
           </a:p>
         </p:txBody>
       </p:sp>
@@ -1058,6 +1132,26 @@
           <a:p>
             <a:r>
               <a:rPr lang="hu-HU" dirty="0"/>
+              <a:t>Miért nem </a:t>
+            </a:r>
+            <a:r>
+              <a:rPr lang="hu-HU" dirty="0" err="1"/>
+              <a:t>WinServer</a:t>
+            </a:r>
+            <a:r>
+              <a:rPr lang="hu-HU" dirty="0"/>
+              <a:t>?</a:t>
+            </a:r>
+          </a:p>
+          <a:p>
+            <a:r>
+              <a:rPr lang="hu-HU" dirty="0"/>
+              <a:t>Licence költség, Erőforrás követelmény, Zárt forráskód, </a:t>
+            </a:r>
+          </a:p>
+          <a:p>
+            <a:r>
+              <a:rPr lang="hu-HU" dirty="0"/>
               <a:t>A </a:t>
             </a:r>
             <a:r>
@@ -1078,9 +1172,6 @@
             </a:r>
           </a:p>
           <a:p>
-            <a:endParaRPr lang="hu-HU" dirty="0"/>
-          </a:p>
-          <a:p>
             <a:r>
               <a:rPr lang="hu-HU" dirty="0"/>
               <a:t>DNS-&gt; BIND 9, ez a szerver a </a:t>
@@ -1095,9 +1186,6 @@
             </a:r>
           </a:p>
           <a:p>
-            <a:endParaRPr lang="hu-HU" dirty="0"/>
-          </a:p>
-          <a:p>
             <a:r>
               <a:rPr lang="hu-HU" dirty="0" err="1"/>
               <a:t>Apache</a:t>
@@ -1116,9 +1204,6 @@
             </a:r>
           </a:p>
           <a:p>
-            <a:endParaRPr lang="hu-HU" dirty="0"/>
-          </a:p>
-          <a:p>
             <a:r>
               <a:rPr lang="hu-HU" dirty="0"/>
               <a:t>SSH – biztonságos távoli belépés, a </a:t>
@@ -1133,16 +1218,10 @@
             </a:r>
           </a:p>
           <a:p>
-            <a:endParaRPr lang="hu-HU" dirty="0"/>
-          </a:p>
-          <a:p>
             <a:r>
               <a:rPr lang="hu-HU" dirty="0"/>
               <a:t>FTP – nem használjuk, de alap funkcióként beállításra került</a:t>
             </a:r>
-          </a:p>
-          <a:p>
-            <a:endParaRPr lang="hu-HU" dirty="0"/>
           </a:p>
           <a:p>
             <a:r>
@@ -2632,7 +2711,7 @@
           <a:p>
             <a:fld id="{5BCAD085-E8A6-8845-BD4E-CB4CCA059FC4}" type="datetimeFigureOut">
               <a:rPr lang="en-US" smtClean="0"/>
-              <a:t>6/8/2024</a:t>
+              <a:t>6/9/2024</a:t>
             </a:fld>
             <a:endParaRPr lang="en-US"/>
           </a:p>
@@ -2800,7 +2879,7 @@
           <a:p>
             <a:fld id="{5BCAD085-E8A6-8845-BD4E-CB4CCA059FC4}" type="datetimeFigureOut">
               <a:rPr lang="en-US" smtClean="0"/>
-              <a:t>6/8/2024</a:t>
+              <a:t>6/9/2024</a:t>
             </a:fld>
             <a:endParaRPr lang="en-US"/>
           </a:p>
@@ -2978,7 +3057,7 @@
           <a:p>
             <a:fld id="{5BCAD085-E8A6-8845-BD4E-CB4CCA059FC4}" type="datetimeFigureOut">
               <a:rPr lang="en-US" smtClean="0"/>
-              <a:t>6/8/2024</a:t>
+              <a:t>6/9/2024</a:t>
             </a:fld>
             <a:endParaRPr lang="en-US"/>
           </a:p>
@@ -3146,7 +3225,7 @@
           <a:p>
             <a:fld id="{5BCAD085-E8A6-8845-BD4E-CB4CCA059FC4}" type="datetimeFigureOut">
               <a:rPr lang="en-US" smtClean="0"/>
-              <a:t>6/8/2024</a:t>
+              <a:t>6/9/2024</a:t>
             </a:fld>
             <a:endParaRPr lang="en-US"/>
           </a:p>
@@ -3391,7 +3470,7 @@
           <a:p>
             <a:fld id="{5BCAD085-E8A6-8845-BD4E-CB4CCA059FC4}" type="datetimeFigureOut">
               <a:rPr lang="en-US" smtClean="0"/>
-              <a:t>6/8/2024</a:t>
+              <a:t>6/9/2024</a:t>
             </a:fld>
             <a:endParaRPr lang="en-US"/>
           </a:p>
@@ -3676,7 +3755,7 @@
           <a:p>
             <a:fld id="{5BCAD085-E8A6-8845-BD4E-CB4CCA059FC4}" type="datetimeFigureOut">
               <a:rPr lang="en-US" smtClean="0"/>
-              <a:t>6/8/2024</a:t>
+              <a:t>6/9/2024</a:t>
             </a:fld>
             <a:endParaRPr lang="en-US"/>
           </a:p>
@@ -4095,7 +4174,7 @@
           <a:p>
             <a:fld id="{5BCAD085-E8A6-8845-BD4E-CB4CCA059FC4}" type="datetimeFigureOut">
               <a:rPr lang="en-US" smtClean="0"/>
-              <a:t>6/8/2024</a:t>
+              <a:t>6/9/2024</a:t>
             </a:fld>
             <a:endParaRPr lang="en-US"/>
           </a:p>
@@ -4212,7 +4291,7 @@
           <a:p>
             <a:fld id="{5BCAD085-E8A6-8845-BD4E-CB4CCA059FC4}" type="datetimeFigureOut">
               <a:rPr lang="en-US" smtClean="0"/>
-              <a:t>6/8/2024</a:t>
+              <a:t>6/9/2024</a:t>
             </a:fld>
             <a:endParaRPr lang="en-US"/>
           </a:p>
@@ -4307,7 +4386,7 @@
           <a:p>
             <a:fld id="{5BCAD085-E8A6-8845-BD4E-CB4CCA059FC4}" type="datetimeFigureOut">
               <a:rPr lang="en-US" smtClean="0"/>
-              <a:t>6/8/2024</a:t>
+              <a:t>6/9/2024</a:t>
             </a:fld>
             <a:endParaRPr lang="en-US"/>
           </a:p>
@@ -4582,7 +4661,7 @@
           <a:p>
             <a:fld id="{5BCAD085-E8A6-8845-BD4E-CB4CCA059FC4}" type="datetimeFigureOut">
               <a:rPr lang="en-US" smtClean="0"/>
-              <a:t>6/8/2024</a:t>
+              <a:t>6/9/2024</a:t>
             </a:fld>
             <a:endParaRPr lang="en-US"/>
           </a:p>
@@ -4834,7 +4913,7 @@
           <a:p>
             <a:fld id="{5BCAD085-E8A6-8845-BD4E-CB4CCA059FC4}" type="datetimeFigureOut">
               <a:rPr lang="en-US" smtClean="0"/>
-              <a:t>6/8/2024</a:t>
+              <a:t>6/9/2024</a:t>
             </a:fld>
             <a:endParaRPr lang="en-US"/>
           </a:p>
@@ -5045,7 +5124,7 @@
           <a:p>
             <a:fld id="{5BCAD085-E8A6-8845-BD4E-CB4CCA059FC4}" type="datetimeFigureOut">
               <a:rPr lang="en-US" smtClean="0"/>
-              <a:t>6/8/2024</a:t>
+              <a:t>6/9/2024</a:t>
             </a:fld>
             <a:endParaRPr lang="en-US"/>
           </a:p>

</xml_diff>